<commit_message>
forbedringer i datautveksling betal fra bank/digipost
Digipost og Bank er nå på samme plass i begge dokumenter.
La til eget felt om sjekk av avtale.
Diverse småfikser.
</commit_message>
<xml_diff>
--- a/tjenestebeskrivelse/betal-fra-digipost-datautveksling.pptx
+++ b/tjenestebeskrivelse/betal-fra-digipost-datautveksling.pptx
@@ -6317,13 +6317,26 @@
           <a:p>
             <a:pPr algn="ctr"/>
             <a:r>
+              <a:rPr lang="nb-NO" sz="1000" dirty="0">
+                <a:solidFill>
+                  <a:schemeClr val="tx2"/>
+                </a:solidFill>
+              </a:rPr>
+              <a:t>Inngå </a:t>
+            </a:r>
+            <a:r>
               <a:rPr lang="nb-NO" sz="1000" dirty="0" smtClean="0">
                 <a:solidFill>
                   <a:schemeClr val="tx2"/>
                 </a:solidFill>
               </a:rPr>
-              <a:t>Lagre avtalestatus</a:t>
-            </a:r>
+              <a:t>avtale</a:t>
+            </a:r>
+            <a:endParaRPr lang="nb-NO" sz="1000" dirty="0">
+              <a:solidFill>
+                <a:schemeClr val="tx2"/>
+              </a:solidFill>
+            </a:endParaRPr>
           </a:p>
         </p:txBody>
       </p:sp>
@@ -6362,13 +6375,26 @@
           <a:p>
             <a:pPr algn="ctr"/>
             <a:r>
-              <a:rPr lang="nb-NO" sz="1000" dirty="0" smtClean="0">
+              <a:rPr lang="nb-NO" sz="1000">
                 <a:solidFill>
                   <a:schemeClr val="tx2"/>
                 </a:solidFill>
               </a:rPr>
-              <a:t>Inngå avtale</a:t>
-            </a:r>
+              <a:t>Lagre </a:t>
+            </a:r>
+            <a:r>
+              <a:rPr lang="nb-NO" sz="1000" smtClean="0">
+                <a:solidFill>
+                  <a:schemeClr val="tx2"/>
+                </a:solidFill>
+              </a:rPr>
+              <a:t>avtale</a:t>
+            </a:r>
+            <a:endParaRPr lang="nb-NO" sz="1000" dirty="0">
+              <a:solidFill>
+                <a:schemeClr val="tx2"/>
+              </a:solidFill>
+            </a:endParaRPr>
           </a:p>
         </p:txBody>
       </p:sp>
@@ -6407,13 +6433,26 @@
           <a:p>
             <a:pPr algn="ctr"/>
             <a:r>
+              <a:rPr lang="nb-NO" sz="1000" dirty="0">
+                <a:solidFill>
+                  <a:schemeClr val="tx2"/>
+                </a:solidFill>
+              </a:rPr>
+              <a:t>Legg faktura til </a:t>
+            </a:r>
+            <a:r>
               <a:rPr lang="nb-NO" sz="1000" dirty="0" smtClean="0">
                 <a:solidFill>
                   <a:schemeClr val="tx2"/>
                 </a:solidFill>
               </a:rPr>
-              <a:t>Behandle faktura</a:t>
-            </a:r>
+              <a:t>forfall</a:t>
+            </a:r>
+            <a:endParaRPr lang="nb-NO" sz="1000" dirty="0">
+              <a:solidFill>
+                <a:schemeClr val="tx2"/>
+              </a:solidFill>
+            </a:endParaRPr>
           </a:p>
         </p:txBody>
       </p:sp>
@@ -6452,14 +6491,22 @@
           <a:p>
             <a:pPr algn="ctr"/>
             <a:r>
+              <a:rPr lang="nb-NO" sz="1000" dirty="0">
+                <a:solidFill>
+                  <a:schemeClr val="tx2"/>
+                </a:solidFill>
+              </a:rPr>
+              <a:t>Behandle </a:t>
+            </a:r>
+            <a:r>
               <a:rPr lang="nb-NO" sz="1000" dirty="0" smtClean="0">
                 <a:solidFill>
                   <a:schemeClr val="tx2"/>
                 </a:solidFill>
               </a:rPr>
-              <a:t>Legg faktura til forfall</a:t>
-            </a:r>
-            <a:endParaRPr lang="nb-NO" sz="1000" dirty="0" smtClean="0">
+              <a:t>faktura</a:t>
+            </a:r>
+            <a:endParaRPr lang="nb-NO" sz="1000" dirty="0">
               <a:solidFill>
                 <a:schemeClr val="tx2"/>
               </a:solidFill>
@@ -6510,13 +6557,8 @@
                   <a:schemeClr val="tx2"/>
                 </a:solidFill>
               </a:rPr>
-              <a:t>Bank</a:t>
-            </a:r>
-            <a:endParaRPr lang="nb-NO" sz="1000" b="1" dirty="0" smtClean="0">
-              <a:solidFill>
-                <a:schemeClr val="tx2"/>
-              </a:solidFill>
-            </a:endParaRPr>
+              <a:t>Digipost</a:t>
+            </a:r>
           </a:p>
         </p:txBody>
       </p:sp>
@@ -6563,7 +6605,7 @@
                   <a:schemeClr val="tx2"/>
                 </a:solidFill>
               </a:rPr>
-              <a:t>Digipost</a:t>
+              <a:t>Bank</a:t>
             </a:r>
             <a:endParaRPr lang="nb-NO" sz="1000" b="1" dirty="0">
               <a:solidFill>
@@ -6591,7 +6633,8 @@
             <a:avLst/>
           </a:prstGeom>
           <a:ln w="12700">
-            <a:tailEnd type="arrow"/>
+            <a:headEnd type="arrow"/>
+            <a:tailEnd type="none"/>
           </a:ln>
         </p:spPr>
         <p:style>
@@ -6739,15 +6782,7 @@
                   <a:schemeClr val="tx2"/>
                 </a:solidFill>
               </a:rPr>
-              <a:t>) </a:t>
-            </a:r>
-            <a:r>
-              <a:rPr lang="nb-NO" sz="1000" b="1" dirty="0" smtClean="0">
-                <a:solidFill>
-                  <a:schemeClr val="tx2"/>
-                </a:solidFill>
-              </a:rPr>
-              <a:t>Opprette avtale</a:t>
+              <a:t>) Opprette avtale</a:t>
             </a:r>
           </a:p>
         </p:txBody>
@@ -6770,8 +6805,8 @@
             <a:avLst/>
           </a:prstGeom>
           <a:ln w="12700">
-            <a:headEnd type="arrow"/>
-            <a:tailEnd type="none"/>
+            <a:headEnd type="none"/>
+            <a:tailEnd type="arrow"/>
           </a:ln>
         </p:spPr>
         <p:style>
@@ -6841,29 +6876,8 @@
                   <a:schemeClr val="tx2"/>
                 </a:solidFill>
               </a:rPr>
-              <a:t>) </a:t>
-            </a:r>
-            <a:r>
-              <a:rPr lang="nb-NO" sz="1000" b="1" dirty="0" smtClean="0">
-                <a:solidFill>
-                  <a:schemeClr val="tx2"/>
-                </a:solidFill>
-              </a:rPr>
-              <a:t>Behandle </a:t>
-            </a:r>
-            <a:r>
-              <a:rPr lang="nb-NO" sz="1000" b="1" dirty="0" smtClean="0">
-                <a:solidFill>
-                  <a:schemeClr val="tx2"/>
-                </a:solidFill>
-              </a:rPr>
-              <a:t>faktura</a:t>
-            </a:r>
-            <a:endParaRPr lang="nb-NO" sz="1000" b="1" dirty="0" smtClean="0">
-              <a:solidFill>
-                <a:schemeClr val="tx2"/>
-              </a:solidFill>
-            </a:endParaRPr>
+              <a:t>) Behandle faktura</a:t>
+            </a:r>
           </a:p>
         </p:txBody>
       </p:sp>
@@ -6920,21 +6934,8 @@
                   <a:schemeClr val="tx2"/>
                 </a:solidFill>
               </a:rPr>
-              <a:t>- </a:t>
-            </a:r>
-            <a:r>
-              <a:rPr lang="nb-NO" sz="800" dirty="0" err="1" smtClean="0">
-                <a:solidFill>
-                  <a:schemeClr val="tx2"/>
-                </a:solidFill>
-              </a:rPr>
-              <a:t>Avtalestatus</a:t>
-            </a:r>
-            <a:endParaRPr lang="nb-NO" sz="800" dirty="0" smtClean="0">
-              <a:solidFill>
-                <a:schemeClr val="tx2"/>
-              </a:solidFill>
-            </a:endParaRPr>
+              <a:t>- Avtale</a:t>
+            </a:r>
           </a:p>
         </p:txBody>
       </p:sp>
@@ -6981,21 +6982,8 @@
                   <a:schemeClr val="tx2"/>
                 </a:solidFill>
               </a:rPr>
-              <a:t>- </a:t>
-            </a:r>
-            <a:r>
-              <a:rPr lang="nb-NO" sz="800" dirty="0" smtClean="0">
-                <a:solidFill>
-                  <a:schemeClr val="tx2"/>
-                </a:solidFill>
-              </a:rPr>
-              <a:t>FNR</a:t>
-            </a:r>
-            <a:endParaRPr lang="nb-NO" sz="800" dirty="0" smtClean="0">
-              <a:solidFill>
-                <a:schemeClr val="tx2"/>
-              </a:solidFill>
-            </a:endParaRPr>
+              <a:t>- FNR</a:t>
+            </a:r>
           </a:p>
           <a:p>
             <a:r>
@@ -7269,7 +7257,7 @@
         <p:spPr>
           <a:xfrm>
             <a:off x="1773483" y="4192674"/>
-            <a:ext cx="1597910" cy="1100301"/>
+            <a:ext cx="1597910" cy="1692771"/>
           </a:xfrm>
           <a:prstGeom prst="rect">
             <a:avLst/>
@@ -7295,31 +7283,7 @@
                   <a:schemeClr val="tx2"/>
                 </a:solidFill>
               </a:rPr>
-              <a:t>Digipost spør </a:t>
-            </a:r>
-            <a:r>
-              <a:rPr lang="nb-NO" sz="900" dirty="0" smtClean="0">
-                <a:solidFill>
-                  <a:schemeClr val="tx2"/>
-                </a:solidFill>
-              </a:rPr>
-              <a:t>kunde (som har </a:t>
-            </a:r>
-            <a:r>
-              <a:rPr lang="nb-NO" sz="900" dirty="0" smtClean="0">
-                <a:solidFill>
-                  <a:schemeClr val="tx2"/>
-                </a:solidFill>
-              </a:rPr>
-              <a:t>kundeforhold i banken) </a:t>
-            </a:r>
-            <a:r>
-              <a:rPr lang="nb-NO" sz="900" dirty="0" smtClean="0">
-                <a:solidFill>
-                  <a:schemeClr val="tx2"/>
-                </a:solidFill>
-              </a:rPr>
-              <a:t>om å inngå avtale</a:t>
+              <a:t>Digipost tilbyr kunden fakturabetaling i nettbanken</a:t>
             </a:r>
           </a:p>
           <a:p>
@@ -7331,26 +7295,30 @@
               <a:buChar char="•"/>
             </a:pPr>
             <a:r>
-              <a:rPr lang="nb-NO" sz="900" dirty="0">
+              <a:rPr lang="nb-NO" sz="900" dirty="0" smtClean="0">
                 <a:solidFill>
                   <a:schemeClr val="tx2"/>
                 </a:solidFill>
               </a:rPr>
-              <a:t>Avtalestatus overføres til </a:t>
-            </a:r>
+              <a:t>Kunden velger bank og inngår samtykke til at Digipost henter kontoliste</a:t>
+            </a:r>
+          </a:p>
+          <a:p>
+            <a:pPr marL="171450" indent="-171450">
+              <a:spcAft>
+                <a:spcPts val="300"/>
+              </a:spcAft>
+              <a:buFont typeface="Arial" panose="020B0604020202020204" pitchFamily="34" charset="0"/>
+              <a:buChar char="•"/>
+            </a:pPr>
             <a:r>
               <a:rPr lang="nb-NO" sz="900" dirty="0" smtClean="0">
                 <a:solidFill>
                   <a:schemeClr val="tx2"/>
                 </a:solidFill>
               </a:rPr>
-              <a:t>banken</a:t>
-            </a:r>
-            <a:endParaRPr lang="nb-NO" sz="900" dirty="0" smtClean="0">
-              <a:solidFill>
-                <a:schemeClr val="tx2"/>
-              </a:solidFill>
-            </a:endParaRPr>
+              <a:t>Samtykke overføres til banken og avtale opprettes</a:t>
+            </a:r>
           </a:p>
         </p:txBody>
       </p:sp>
@@ -7500,21 +7468,8 @@
                   <a:schemeClr val="tx2"/>
                 </a:solidFill>
               </a:rPr>
-              <a:t>) </a:t>
-            </a:r>
-            <a:r>
-              <a:rPr lang="nb-NO" sz="1000" b="1" dirty="0" smtClean="0">
-                <a:solidFill>
-                  <a:schemeClr val="tx2"/>
-                </a:solidFill>
-              </a:rPr>
-              <a:t>Valg av betalingskonto(er)</a:t>
-            </a:r>
-            <a:endParaRPr lang="nb-NO" sz="1000" b="1" dirty="0" smtClean="0">
-              <a:solidFill>
-                <a:schemeClr val="tx2"/>
-              </a:solidFill>
-            </a:endParaRPr>
+              <a:t>) Valg av betalingskonto(er)</a:t>
+            </a:r>
           </a:p>
         </p:txBody>
       </p:sp>
@@ -7615,14 +7570,22 @@
           <a:p>
             <a:pPr algn="ctr"/>
             <a:r>
+              <a:rPr lang="nb-NO" sz="1000" dirty="0">
+                <a:solidFill>
+                  <a:schemeClr val="tx2"/>
+                </a:solidFill>
+              </a:rPr>
+              <a:t>Velge konto(er) for </a:t>
+            </a:r>
+            <a:r>
               <a:rPr lang="nb-NO" sz="1000" dirty="0" smtClean="0">
                 <a:solidFill>
                   <a:schemeClr val="tx2"/>
                 </a:solidFill>
               </a:rPr>
-              <a:t>Liste kontoer</a:t>
-            </a:r>
-            <a:endParaRPr lang="nb-NO" sz="1000" dirty="0" smtClean="0">
+              <a:t>betaling</a:t>
+            </a:r>
+            <a:endParaRPr lang="nb-NO" sz="1000" dirty="0">
               <a:solidFill>
                 <a:schemeClr val="tx2"/>
               </a:solidFill>
@@ -7665,12 +7628,20 @@
           <a:p>
             <a:pPr algn="ctr"/>
             <a:r>
+              <a:rPr lang="nb-NO" sz="1000" dirty="0">
+                <a:solidFill>
+                  <a:schemeClr val="tx2"/>
+                </a:solidFill>
+              </a:rPr>
+              <a:t>Liste </a:t>
+            </a:r>
+            <a:r>
               <a:rPr lang="nb-NO" sz="1000" dirty="0" smtClean="0">
                 <a:solidFill>
                   <a:schemeClr val="tx2"/>
                 </a:solidFill>
               </a:rPr>
-              <a:t>Velge konto(er) for betaling</a:t>
+              <a:t>kontoer</a:t>
             </a:r>
             <a:endParaRPr lang="nb-NO" sz="1000" dirty="0">
               <a:solidFill>
@@ -7695,7 +7666,8 @@
             <a:avLst/>
           </a:prstGeom>
           <a:ln w="12700">
-            <a:tailEnd type="arrow"/>
+            <a:headEnd type="arrow"/>
+            <a:tailEnd type="none"/>
           </a:ln>
         </p:spPr>
         <p:style>
@@ -7781,11 +7753,6 @@
               </a:rPr>
               <a:t>- Kontoalias</a:t>
             </a:r>
-            <a:endParaRPr lang="nb-NO" sz="800" dirty="0" smtClean="0">
-              <a:solidFill>
-                <a:schemeClr val="tx2"/>
-              </a:solidFill>
-            </a:endParaRPr>
           </a:p>
         </p:txBody>
       </p:sp>
@@ -7804,7 +7771,8 @@
             <a:avLst/>
           </a:prstGeom>
           <a:ln w="12700">
-            <a:tailEnd type="arrow"/>
+            <a:headEnd type="arrow"/>
+            <a:tailEnd type="none"/>
           </a:ln>
         </p:spPr>
         <p:style>
@@ -7975,7 +7943,7 @@
             <a:avLst/>
           </a:prstGeom>
           <a:ln w="12700">
-            <a:headEnd type="arrow"/>
+            <a:headEnd type="none"/>
             <a:tailEnd type="arrow"/>
           </a:ln>
         </p:spPr>
@@ -8046,15 +8014,7 @@
                   <a:schemeClr val="tx2"/>
                 </a:solidFill>
               </a:rPr>
-              <a:t>) </a:t>
-            </a:r>
-            <a:r>
-              <a:rPr lang="nb-NO" sz="1000" b="1" dirty="0" smtClean="0">
-                <a:solidFill>
-                  <a:schemeClr val="tx2"/>
-                </a:solidFill>
-              </a:rPr>
-              <a:t>Oppsigelse av avtale</a:t>
+              <a:t>) Oppsigelse av avtale</a:t>
             </a:r>
           </a:p>
         </p:txBody>
@@ -8112,7 +8072,7 @@
                   <a:schemeClr val="tx2"/>
                 </a:solidFill>
               </a:rPr>
-              <a:t>- Avtalestatus</a:t>
+              <a:t>- Avtale</a:t>
             </a:r>
           </a:p>
         </p:txBody>
@@ -8165,7 +8125,7 @@
         <p:spPr>
           <a:xfrm>
             <a:off x="7768135" y="4386320"/>
-            <a:ext cx="1526886" cy="1100301"/>
+            <a:ext cx="1526886" cy="1692771"/>
           </a:xfrm>
           <a:prstGeom prst="rect">
             <a:avLst/>
@@ -8208,7 +8168,24 @@
                   <a:schemeClr val="tx2"/>
                 </a:solidFill>
               </a:rPr>
-              <a:t>Ny avtalestatus overføres til den annen part</a:t>
+              <a:t>Ny avtalestatus overføres til banken</a:t>
+            </a:r>
+          </a:p>
+          <a:p>
+            <a:pPr marL="171450" indent="-171450">
+              <a:spcAft>
+                <a:spcPts val="300"/>
+              </a:spcAft>
+              <a:buFont typeface="Arial" panose="020B0604020202020204" pitchFamily="34" charset="0"/>
+              <a:buChar char="•"/>
+            </a:pPr>
+            <a:r>
+              <a:rPr lang="nb-NO" sz="900" dirty="0" smtClean="0">
+                <a:solidFill>
+                  <a:schemeClr val="tx2"/>
+                </a:solidFill>
+              </a:rPr>
+              <a:t>Hvis avtale avsluttes i banken vil Digipost få en feilmelding ved neste betaling</a:t>
             </a:r>
             <a:endParaRPr lang="nb-NO" sz="900" dirty="0">
               <a:solidFill>
@@ -8701,6 +8678,12 @@
 </file>
 
 <file path=customXml/item1.xml><?xml version="1.0" encoding="utf-8"?>
+<p:properties xmlns:p="http://schemas.microsoft.com/office/2006/metadata/properties" xmlns:xsi="http://www.w3.org/2001/XMLSchema-instance" xmlns:pc="http://schemas.microsoft.com/office/infopath/2007/PartnerControls">
+  <documentManagement/>
+</p:properties>
+</file>
+
+<file path=customXml/item2.xml><?xml version="1.0" encoding="utf-8"?>
 <?mso-contentType ?>
 <FormTemplates xmlns="http://schemas.microsoft.com/sharepoint/v3/contenttype/forms">
   <Display>DocumentLibraryForm</Display>
@@ -8709,7 +8692,7 @@
 </FormTemplates>
 </file>
 
-<file path=customXml/item2.xml><?xml version="1.0" encoding="utf-8"?>
+<file path=customXml/item3.xml><?xml version="1.0" encoding="utf-8"?>
 <ct:contentTypeSchema xmlns:ct="http://schemas.microsoft.com/office/2006/metadata/contentType" xmlns:ma="http://schemas.microsoft.com/office/2006/metadata/properties/metaAttributes" ct:_="" ma:_="" ma:contentTypeName="Dokument" ma:contentTypeID="0x0101004B4D9082DD66B64198C91D1A3B1A18D3" ma:contentTypeVersion="0" ma:contentTypeDescription="Opprett et nytt dokument." ma:contentTypeScope="" ma:versionID="b8447cf1a51e372ca5d1b428ae7d66a3">
   <xsd:schema xmlns:xsd="http://www.w3.org/2001/XMLSchema" xmlns:xs="http://www.w3.org/2001/XMLSchema" xmlns:p="http://schemas.microsoft.com/office/2006/metadata/properties" targetNamespace="http://schemas.microsoft.com/office/2006/metadata/properties" ma:root="true" ma:fieldsID="5eb6cd67344829d3a956a36ab89737e9">
     <xsd:element name="properties">
@@ -8823,13 +8806,22 @@
 </ct:contentTypeSchema>
 </file>
 
-<file path=customXml/item3.xml><?xml version="1.0" encoding="utf-8"?>
-<p:properties xmlns:p="http://schemas.microsoft.com/office/2006/metadata/properties" xmlns:xsi="http://www.w3.org/2001/XMLSchema-instance" xmlns:pc="http://schemas.microsoft.com/office/infopath/2007/PartnerControls">
-  <documentManagement/>
-</p:properties>
+<file path=customXml/itemProps1.xml><?xml version="1.0" encoding="utf-8"?>
+<ds:datastoreItem xmlns:ds="http://schemas.openxmlformats.org/officeDocument/2006/customXml" ds:itemID="{9AFA195F-2306-4BC4-B169-4FF134F932BC}">
+  <ds:schemaRefs>
+    <ds:schemaRef ds:uri="http://purl.org/dc/elements/1.1/"/>
+    <ds:schemaRef ds:uri="http://schemas.openxmlformats.org/package/2006/metadata/core-properties"/>
+    <ds:schemaRef ds:uri="http://purl.org/dc/dcmitype/"/>
+    <ds:schemaRef ds:uri="http://purl.org/dc/terms/"/>
+    <ds:schemaRef ds:uri="http://schemas.microsoft.com/office/infopath/2007/PartnerControls"/>
+    <ds:schemaRef ds:uri="http://schemas.microsoft.com/office/2006/documentManagement/types"/>
+    <ds:schemaRef ds:uri="http://schemas.microsoft.com/office/2006/metadata/properties"/>
+    <ds:schemaRef ds:uri="http://www.w3.org/XML/1998/namespace"/>
+  </ds:schemaRefs>
+</ds:datastoreItem>
 </file>
 
-<file path=customXml/itemProps1.xml><?xml version="1.0" encoding="utf-8"?>
+<file path=customXml/itemProps2.xml><?xml version="1.0" encoding="utf-8"?>
 <ds:datastoreItem xmlns:ds="http://schemas.openxmlformats.org/officeDocument/2006/customXml" ds:itemID="{4B4E3570-6711-4C66-AB68-238B2E6B7703}">
   <ds:schemaRefs>
     <ds:schemaRef ds:uri="http://schemas.microsoft.com/sharepoint/v3/contenttype/forms"/>
@@ -8837,7 +8829,7 @@
 </ds:datastoreItem>
 </file>
 
-<file path=customXml/itemProps2.xml><?xml version="1.0" encoding="utf-8"?>
+<file path=customXml/itemProps3.xml><?xml version="1.0" encoding="utf-8"?>
 <ds:datastoreItem xmlns:ds="http://schemas.openxmlformats.org/officeDocument/2006/customXml" ds:itemID="{5259FE7A-3C72-451A-9F91-5160E6070FE2}">
   <ds:schemaRefs>
     <ds:schemaRef ds:uri="http://schemas.microsoft.com/office/2006/metadata/contentType"/>
@@ -8851,19 +8843,4 @@
     <ds:schemaRef ds:uri="http://schemas.microsoft.com/office/infopath/2007/PartnerControls"/>
   </ds:schemaRefs>
 </ds:datastoreItem>
-</file>
-
-<file path=customXml/itemProps3.xml><?xml version="1.0" encoding="utf-8"?>
-<ds:datastoreItem xmlns:ds="http://schemas.openxmlformats.org/officeDocument/2006/customXml" ds:itemID="{9AFA195F-2306-4BC4-B169-4FF134F932BC}">
-  <ds:schemaRefs>
-    <ds:schemaRef ds:uri="http://purl.org/dc/elements/1.1/"/>
-    <ds:schemaRef ds:uri="http://schemas.openxmlformats.org/package/2006/metadata/core-properties"/>
-    <ds:schemaRef ds:uri="http://purl.org/dc/dcmitype/"/>
-    <ds:schemaRef ds:uri="http://purl.org/dc/terms/"/>
-    <ds:schemaRef ds:uri="http://schemas.microsoft.com/office/infopath/2007/PartnerControls"/>
-    <ds:schemaRef ds:uri="http://schemas.microsoft.com/office/2006/documentManagement/types"/>
-    <ds:schemaRef ds:uri="http://schemas.microsoft.com/office/2006/metadata/properties"/>
-    <ds:schemaRef ds:uri="http://www.w3.org/XML/1998/namespace"/>
-  </ds:schemaRefs>
-</ds:datastoreItem>
 </file>
</xml_diff>

<commit_message>
Endret fra avtale til samtykke
</commit_message>
<xml_diff>
--- a/tjenestebeskrivelse/betal-fra-digipost-datautveksling.pptx
+++ b/tjenestebeskrivelse/betal-fra-digipost-datautveksling.pptx
@@ -213,7 +213,7 @@
           <a:p>
             <a:fld id="{0084CF28-7206-490D-88DB-D81AE5664365}" type="datetimeFigureOut">
               <a:rPr lang="en-GB" smtClean="0"/>
-              <a:t>24/08/2016</a:t>
+              <a:t>25/08/2016</a:t>
             </a:fld>
             <a:endParaRPr lang="en-GB"/>
           </a:p>
@@ -6330,7 +6330,7 @@
                   <a:schemeClr val="tx2"/>
                 </a:solidFill>
               </a:rPr>
-              <a:t>avtale</a:t>
+              <a:t>samtykke</a:t>
             </a:r>
             <a:endParaRPr lang="nb-NO" sz="1000" dirty="0">
               <a:solidFill>
@@ -6375,7 +6375,7 @@
           <a:p>
             <a:pPr algn="ctr"/>
             <a:r>
-              <a:rPr lang="nb-NO" sz="1000">
+              <a:rPr lang="nb-NO" sz="1000" dirty="0">
                 <a:solidFill>
                   <a:schemeClr val="tx2"/>
                 </a:solidFill>
@@ -6383,12 +6383,12 @@
               <a:t>Lagre </a:t>
             </a:r>
             <a:r>
-              <a:rPr lang="nb-NO" sz="1000" smtClean="0">
+              <a:rPr lang="nb-NO" sz="1000" dirty="0" smtClean="0">
                 <a:solidFill>
                   <a:schemeClr val="tx2"/>
                 </a:solidFill>
               </a:rPr>
-              <a:t>avtale</a:t>
+              <a:t>samtykke</a:t>
             </a:r>
             <a:endParaRPr lang="nb-NO" sz="1000" dirty="0">
               <a:solidFill>
@@ -6782,7 +6782,7 @@
                   <a:schemeClr val="tx2"/>
                 </a:solidFill>
               </a:rPr>
-              <a:t>) Opprette avtale</a:t>
+              <a:t>) Inngå samtykke</a:t>
             </a:r>
           </a:p>
         </p:txBody>
@@ -6934,7 +6934,7 @@
                   <a:schemeClr val="tx2"/>
                 </a:solidFill>
               </a:rPr>
-              <a:t>- Avtale</a:t>
+              <a:t>- Samtykke</a:t>
             </a:r>
           </a:p>
         </p:txBody>
@@ -7257,7 +7257,7 @@
         <p:spPr>
           <a:xfrm>
             <a:off x="1773483" y="4192674"/>
-            <a:ext cx="1597910" cy="1692771"/>
+            <a:ext cx="1597910" cy="1415772"/>
           </a:xfrm>
           <a:prstGeom prst="rect">
             <a:avLst/>
@@ -7283,7 +7283,7 @@
                   <a:schemeClr val="tx2"/>
                 </a:solidFill>
               </a:rPr>
-              <a:t>Digipost tilbyr kunden fakturabetaling i nettbanken</a:t>
+              <a:t>Kunden samtykker til at Digipost henter kontoliste fra banken</a:t>
             </a:r>
           </a:p>
           <a:p>
@@ -7300,7 +7300,7 @@
                   <a:schemeClr val="tx2"/>
                 </a:solidFill>
               </a:rPr>
-              <a:t>Kunden velger bank og inngår samtykke til at Digipost henter kontoliste</a:t>
+              <a:t>Kontolisten lagres slik at kunden senere kan velge konto for fakturabetaling</a:t>
             </a:r>
           </a:p>
           <a:p>
@@ -7317,7 +7317,7 @@
                   <a:schemeClr val="tx2"/>
                 </a:solidFill>
               </a:rPr>
-              <a:t>Samtykke overføres til banken og avtale opprettes</a:t>
+              <a:t>Samtykket overføres også til banken</a:t>
             </a:r>
           </a:p>
         </p:txBody>
@@ -7878,7 +7878,7 @@
                   <a:schemeClr val="tx2"/>
                 </a:solidFill>
               </a:rPr>
-              <a:t>Trekke tilbake avtale</a:t>
+              <a:t>Trekke tilbake samtykke</a:t>
             </a:r>
           </a:p>
         </p:txBody>
@@ -7923,8 +7923,13 @@
                   <a:schemeClr val="tx2"/>
                 </a:solidFill>
               </a:rPr>
-              <a:t>Trekke tilbake avtale</a:t>
-            </a:r>
+              <a:t>Slette samtykke</a:t>
+            </a:r>
+            <a:endParaRPr lang="nb-NO" sz="1000" dirty="0" smtClean="0">
+              <a:solidFill>
+                <a:schemeClr val="tx2"/>
+              </a:solidFill>
+            </a:endParaRPr>
           </a:p>
         </p:txBody>
       </p:sp>
@@ -8014,7 +8019,7 @@
                   <a:schemeClr val="tx2"/>
                 </a:solidFill>
               </a:rPr>
-              <a:t>) Oppsigelse av avtale</a:t>
+              <a:t>) Trekke tilbake samtykke</a:t>
             </a:r>
           </a:p>
         </p:txBody>
@@ -8072,7 +8077,7 @@
                   <a:schemeClr val="tx2"/>
                 </a:solidFill>
               </a:rPr>
-              <a:t>- Avtale</a:t>
+              <a:t>- Samtykke</a:t>
             </a:r>
           </a:p>
         </p:txBody>
@@ -8151,7 +8156,7 @@
                   <a:schemeClr val="tx2"/>
                 </a:solidFill>
               </a:rPr>
-              <a:t>Kunde ønsker å avslutte avtalen i banken eller Digipost</a:t>
+              <a:t>Kunde ønsker ikke lenger at Digipost skal hente eller lagre kontonumre fra banken</a:t>
             </a:r>
           </a:p>
           <a:p>
@@ -8168,7 +8173,7 @@
                   <a:schemeClr val="tx2"/>
                 </a:solidFill>
               </a:rPr>
-              <a:t>Ny avtalestatus overføres til banken</a:t>
+              <a:t>Kontoliste slettes fra Digipost</a:t>
             </a:r>
           </a:p>
           <a:p>
@@ -8185,13 +8190,8 @@
                   <a:schemeClr val="tx2"/>
                 </a:solidFill>
               </a:rPr>
-              <a:t>Hvis avtale avsluttes i banken vil Digipost få en feilmelding ved neste betaling</a:t>
-            </a:r>
-            <a:endParaRPr lang="nb-NO" sz="900" dirty="0">
-              <a:solidFill>
-                <a:schemeClr val="tx2"/>
-              </a:solidFill>
-            </a:endParaRPr>
+              <a:t>Digipost gir beskjed til banken om at samtykket er trukket tilbake </a:t>
+            </a:r>
           </a:p>
         </p:txBody>
       </p:sp>
@@ -8678,21 +8678,6 @@
 </file>
 
 <file path=customXml/item1.xml><?xml version="1.0" encoding="utf-8"?>
-<p:properties xmlns:p="http://schemas.microsoft.com/office/2006/metadata/properties" xmlns:xsi="http://www.w3.org/2001/XMLSchema-instance" xmlns:pc="http://schemas.microsoft.com/office/infopath/2007/PartnerControls">
-  <documentManagement/>
-</p:properties>
-</file>
-
-<file path=customXml/item2.xml><?xml version="1.0" encoding="utf-8"?>
-<?mso-contentType ?>
-<FormTemplates xmlns="http://schemas.microsoft.com/sharepoint/v3/contenttype/forms">
-  <Display>DocumentLibraryForm</Display>
-  <Edit>DocumentLibraryForm</Edit>
-  <New>DocumentLibraryForm</New>
-</FormTemplates>
-</file>
-
-<file path=customXml/item3.xml><?xml version="1.0" encoding="utf-8"?>
 <ct:contentTypeSchema xmlns:ct="http://schemas.microsoft.com/office/2006/metadata/contentType" xmlns:ma="http://schemas.microsoft.com/office/2006/metadata/properties/metaAttributes" ct:_="" ma:_="" ma:contentTypeName="Dokument" ma:contentTypeID="0x0101004B4D9082DD66B64198C91D1A3B1A18D3" ma:contentTypeVersion="0" ma:contentTypeDescription="Opprett et nytt dokument." ma:contentTypeScope="" ma:versionID="b8447cf1a51e372ca5d1b428ae7d66a3">
   <xsd:schema xmlns:xsd="http://www.w3.org/2001/XMLSchema" xmlns:xs="http://www.w3.org/2001/XMLSchema" xmlns:p="http://schemas.microsoft.com/office/2006/metadata/properties" targetNamespace="http://schemas.microsoft.com/office/2006/metadata/properties" ma:root="true" ma:fieldsID="5eb6cd67344829d3a956a36ab89737e9">
     <xsd:element name="properties">
@@ -8806,7 +8791,38 @@
 </ct:contentTypeSchema>
 </file>
 
+<file path=customXml/item2.xml><?xml version="1.0" encoding="utf-8"?>
+<p:properties xmlns:p="http://schemas.microsoft.com/office/2006/metadata/properties" xmlns:xsi="http://www.w3.org/2001/XMLSchema-instance" xmlns:pc="http://schemas.microsoft.com/office/infopath/2007/PartnerControls">
+  <documentManagement/>
+</p:properties>
+</file>
+
+<file path=customXml/item3.xml><?xml version="1.0" encoding="utf-8"?>
+<?mso-contentType ?>
+<FormTemplates xmlns="http://schemas.microsoft.com/sharepoint/v3/contenttype/forms">
+  <Display>DocumentLibraryForm</Display>
+  <Edit>DocumentLibraryForm</Edit>
+  <New>DocumentLibraryForm</New>
+</FormTemplates>
+</file>
+
 <file path=customXml/itemProps1.xml><?xml version="1.0" encoding="utf-8"?>
+<ds:datastoreItem xmlns:ds="http://schemas.openxmlformats.org/officeDocument/2006/customXml" ds:itemID="{5259FE7A-3C72-451A-9F91-5160E6070FE2}">
+  <ds:schemaRefs>
+    <ds:schemaRef ds:uri="http://schemas.microsoft.com/office/2006/metadata/contentType"/>
+    <ds:schemaRef ds:uri="http://schemas.microsoft.com/office/2006/metadata/properties/metaAttributes"/>
+    <ds:schemaRef ds:uri="http://www.w3.org/2001/XMLSchema"/>
+    <ds:schemaRef ds:uri="http://schemas.microsoft.com/office/2006/metadata/properties"/>
+    <ds:schemaRef ds:uri="http://schemas.openxmlformats.org/package/2006/metadata/core-properties"/>
+    <ds:schemaRef ds:uri="http://purl.org/dc/elements/1.1/"/>
+    <ds:schemaRef ds:uri="http://purl.org/dc/terms/"/>
+    <ds:schemaRef ds:uri="http://schemas.microsoft.com/internal/obd"/>
+    <ds:schemaRef ds:uri="http://schemas.microsoft.com/office/infopath/2007/PartnerControls"/>
+  </ds:schemaRefs>
+</ds:datastoreItem>
+</file>
+
+<file path=customXml/itemProps2.xml><?xml version="1.0" encoding="utf-8"?>
 <ds:datastoreItem xmlns:ds="http://schemas.openxmlformats.org/officeDocument/2006/customXml" ds:itemID="{9AFA195F-2306-4BC4-B169-4FF134F932BC}">
   <ds:schemaRefs>
     <ds:schemaRef ds:uri="http://purl.org/dc/elements/1.1/"/>
@@ -8821,26 +8837,10 @@
 </ds:datastoreItem>
 </file>
 
-<file path=customXml/itemProps2.xml><?xml version="1.0" encoding="utf-8"?>
+<file path=customXml/itemProps3.xml><?xml version="1.0" encoding="utf-8"?>
 <ds:datastoreItem xmlns:ds="http://schemas.openxmlformats.org/officeDocument/2006/customXml" ds:itemID="{4B4E3570-6711-4C66-AB68-238B2E6B7703}">
   <ds:schemaRefs>
     <ds:schemaRef ds:uri="http://schemas.microsoft.com/sharepoint/v3/contenttype/forms"/>
   </ds:schemaRefs>
 </ds:datastoreItem>
-</file>
-
-<file path=customXml/itemProps3.xml><?xml version="1.0" encoding="utf-8"?>
-<ds:datastoreItem xmlns:ds="http://schemas.openxmlformats.org/officeDocument/2006/customXml" ds:itemID="{5259FE7A-3C72-451A-9F91-5160E6070FE2}">
-  <ds:schemaRefs>
-    <ds:schemaRef ds:uri="http://schemas.microsoft.com/office/2006/metadata/contentType"/>
-    <ds:schemaRef ds:uri="http://schemas.microsoft.com/office/2006/metadata/properties/metaAttributes"/>
-    <ds:schemaRef ds:uri="http://www.w3.org/2001/XMLSchema"/>
-    <ds:schemaRef ds:uri="http://schemas.microsoft.com/office/2006/metadata/properties"/>
-    <ds:schemaRef ds:uri="http://schemas.openxmlformats.org/package/2006/metadata/core-properties"/>
-    <ds:schemaRef ds:uri="http://purl.org/dc/elements/1.1/"/>
-    <ds:schemaRef ds:uri="http://purl.org/dc/terms/"/>
-    <ds:schemaRef ds:uri="http://schemas.microsoft.com/internal/obd"/>
-    <ds:schemaRef ds:uri="http://schemas.microsoft.com/office/infopath/2007/PartnerControls"/>
-  </ds:schemaRefs>
-</ds:datastoreItem>
 </file>
</xml_diff>